<commit_message>
add LFSR implementation and stream-cipher presentation
</commit_message>
<xml_diff>
--- a/2.lfsr/LFSR.pptx
+++ b/2.lfsr/LFSR.pptx
@@ -6397,7 +6397,7 @@
   <pc:docChgLst>
     <pc:chgData name="Alex Marchioni" userId="6eb3c6d8-756f-4c94-a08e-610dca54a7e5" providerId="ADAL" clId="{D80EBA76-ABCA-4B0F-8AE0-A2035AE38B0A}"/>
     <pc:docChg chg="custSel modSld">
-      <pc:chgData name="Alex Marchioni" userId="6eb3c6d8-756f-4c94-a08e-610dca54a7e5" providerId="ADAL" clId="{D80EBA76-ABCA-4B0F-8AE0-A2035AE38B0A}" dt="2020-03-23T13:02:45.380" v="191" actId="6549"/>
+      <pc:chgData name="Alex Marchioni" userId="6eb3c6d8-756f-4c94-a08e-610dca54a7e5" providerId="ADAL" clId="{D80EBA76-ABCA-4B0F-8AE0-A2035AE38B0A}" dt="2020-03-30T08:39:29.332" v="199" actId="20577"/>
       <pc:docMkLst>
         <pc:docMk/>
       </pc:docMkLst>
@@ -6477,13 +6477,13 @@
         </pc:spChg>
       </pc:sldChg>
       <pc:sldChg chg="modSp mod">
-        <pc:chgData name="Alex Marchioni" userId="6eb3c6d8-756f-4c94-a08e-610dca54a7e5" providerId="ADAL" clId="{D80EBA76-ABCA-4B0F-8AE0-A2035AE38B0A}" dt="2020-03-10T12:04:51.583" v="67" actId="20577"/>
+        <pc:chgData name="Alex Marchioni" userId="6eb3c6d8-756f-4c94-a08e-610dca54a7e5" providerId="ADAL" clId="{D80EBA76-ABCA-4B0F-8AE0-A2035AE38B0A}" dt="2020-03-30T08:39:29.332" v="199" actId="20577"/>
         <pc:sldMkLst>
           <pc:docMk/>
           <pc:sldMk cId="2143195087" sldId="270"/>
         </pc:sldMkLst>
         <pc:spChg chg="mod">
-          <ac:chgData name="Alex Marchioni" userId="6eb3c6d8-756f-4c94-a08e-610dca54a7e5" providerId="ADAL" clId="{D80EBA76-ABCA-4B0F-8AE0-A2035AE38B0A}" dt="2020-03-10T11:48:55.067" v="65"/>
+          <ac:chgData name="Alex Marchioni" userId="6eb3c6d8-756f-4c94-a08e-610dca54a7e5" providerId="ADAL" clId="{D80EBA76-ABCA-4B0F-8AE0-A2035AE38B0A}" dt="2020-03-30T08:39:29.332" v="199" actId="20577"/>
           <ac:spMkLst>
             <pc:docMk/>
             <pc:sldMk cId="2143195087" sldId="270"/>
@@ -6631,7 +6631,7 @@
           <a:p>
             <a:fld id="{B901049E-A23C-44F2-ADC7-F69A9B226C92}" type="datetimeFigureOut">
               <a:rPr lang="it-IT" smtClean="0"/>
-              <a:t>23/03/2020</a:t>
+              <a:t>30/03/2020</a:t>
             </a:fld>
             <a:endParaRPr lang="it-IT"/>
           </a:p>
@@ -15247,7 +15247,7 @@
                 <a:effectLst/>
                 <a:latin typeface="Consolas" panose="020B0609020204030204" pitchFamily="49" charset="0"/>
               </a:rPr>
-              <a:t> poly</a:t>
+              <a:t> poly, degree</a:t>
             </a:r>
             <a:r>
               <a:rPr kumimoji="0" lang="it-IT" altLang="it-IT" b="0" i="0" u="none" strike="noStrike" cap="none" normalizeH="0" baseline="0" dirty="0">

</xml_diff>